<commit_message>
Compressed Poster file size
</commit_message>
<xml_diff>
--- a/ShowCase Poster.pptx
+++ b/ShowCase Poster.pptx
@@ -3078,7 +3078,13 @@
           <p:nvPr/>
         </p:nvPicPr>
         <p:blipFill>
-          <a:blip r:embed="rId6"/>
+          <a:blip r:embed="rId6" cstate="hqprint">
+            <a:extLst>
+              <a:ext uri="{28A0092B-C50C-407E-A947-70E740481C1C}">
+                <a14:useLocalDpi xmlns:a14="http://schemas.microsoft.com/office/drawing/2010/main"/>
+              </a:ext>
+            </a:extLst>
+          </a:blip>
           <a:stretch>
             <a:fillRect/>
           </a:stretch>
@@ -3108,7 +3114,13 @@
           <p:nvPr/>
         </p:nvPicPr>
         <p:blipFill>
-          <a:blip r:embed="rId7"/>
+          <a:blip r:embed="rId7" cstate="hqprint">
+            <a:extLst>
+              <a:ext uri="{28A0092B-C50C-407E-A947-70E740481C1C}">
+                <a14:useLocalDpi xmlns:a14="http://schemas.microsoft.com/office/drawing/2010/main"/>
+              </a:ext>
+            </a:extLst>
+          </a:blip>
           <a:stretch>
             <a:fillRect/>
           </a:stretch>
@@ -3141,7 +3153,7 @@
           <a:blip r:embed="rId8">
             <a:extLst>
               <a:ext uri="{96DAC541-7B7A-43D3-8B79-37D633B846F1}">
-                <asvg:svgBlip xmlns="" xmlns:asvg="http://schemas.microsoft.com/office/drawing/2016/SVG/main" r:embed="rId9"/>
+                <asvg:svgBlip xmlns:asvg="http://schemas.microsoft.com/office/drawing/2016/SVG/main" xmlns="" r:embed="rId9"/>
               </a:ext>
             </a:extLst>
           </a:blip>
@@ -3177,7 +3189,7 @@
           <a:blip r:embed="rId10">
             <a:extLst>
               <a:ext uri="{96DAC541-7B7A-43D3-8B79-37D633B846F1}">
-                <asvg:svgBlip xmlns="" xmlns:asvg="http://schemas.microsoft.com/office/drawing/2016/SVG/main" r:embed="rId11"/>
+                <asvg:svgBlip xmlns:asvg="http://schemas.microsoft.com/office/drawing/2016/SVG/main" xmlns="" r:embed="rId11"/>
               </a:ext>
             </a:extLst>
           </a:blip>
@@ -3213,7 +3225,7 @@
           <a:blip r:embed="rId12">
             <a:extLst>
               <a:ext uri="{96DAC541-7B7A-43D3-8B79-37D633B846F1}">
-                <asvg:svgBlip xmlns="" xmlns:asvg="http://schemas.microsoft.com/office/drawing/2016/SVG/main" r:embed="rId13"/>
+                <asvg:svgBlip xmlns:asvg="http://schemas.microsoft.com/office/drawing/2016/SVG/main" xmlns="" r:embed="rId13"/>
               </a:ext>
             </a:extLst>
           </a:blip>

</xml_diff>